<commit_message>
update based on feedback
</commit_message>
<xml_diff>
--- a/seminars/EES-11-11-2020/slides.pptx
+++ b/seminars/EES-11-11-2020/slides.pptx
@@ -14,7 +14,7 @@
     <p:sldId id="328" r:id="rId5"/>
     <p:sldId id="330" r:id="rId6"/>
     <p:sldId id="329" r:id="rId7"/>
-    <p:sldId id="305" r:id="rId8"/>
+    <p:sldId id="331" r:id="rId8"/>
     <p:sldId id="306" r:id="rId9"/>
     <p:sldId id="313" r:id="rId10"/>
     <p:sldId id="314" r:id="rId11"/>
@@ -240,7 +240,7 @@
           <a:p>
             <a:fld id="{EE53EDDD-3DA3-4AAC-95AA-050495F7F225}" type="datetimeFigureOut">
               <a:rPr lang="en-AU" smtClean="0"/>
-              <a:t>2/11/2020</a:t>
+              <a:t>3/11/2020</a:t>
             </a:fld>
             <a:endParaRPr lang="en-AU"/>
           </a:p>
@@ -858,7 +858,7 @@
             <a:fld id="{1D8BD707-D9CF-40AE-B4C6-C98DA3205C09}" type="datetimeFigureOut">
               <a:rPr lang="en-US" smtClean="0"/>
               <a:pPr/>
-              <a:t>11/2/2020</a:t>
+              <a:t>11/3/2020</a:t>
             </a:fld>
             <a:endParaRPr lang="en-US"/>
           </a:p>
@@ -1032,7 +1032,7 @@
             <a:fld id="{1D8BD707-D9CF-40AE-B4C6-C98DA3205C09}" type="datetimeFigureOut">
               <a:rPr lang="en-US" smtClean="0"/>
               <a:pPr/>
-              <a:t>11/2/2020</a:t>
+              <a:t>11/3/2020</a:t>
             </a:fld>
             <a:endParaRPr lang="en-US"/>
           </a:p>
@@ -1216,7 +1216,7 @@
             <a:fld id="{1D8BD707-D9CF-40AE-B4C6-C98DA3205C09}" type="datetimeFigureOut">
               <a:rPr lang="en-US" smtClean="0"/>
               <a:pPr/>
-              <a:t>11/2/2020</a:t>
+              <a:t>11/3/2020</a:t>
             </a:fld>
             <a:endParaRPr lang="en-US"/>
           </a:p>
@@ -1390,7 +1390,7 @@
             <a:fld id="{1D8BD707-D9CF-40AE-B4C6-C98DA3205C09}" type="datetimeFigureOut">
               <a:rPr lang="en-US" smtClean="0"/>
               <a:pPr/>
-              <a:t>11/2/2020</a:t>
+              <a:t>11/3/2020</a:t>
             </a:fld>
             <a:endParaRPr lang="en-US"/>
           </a:p>
@@ -1640,7 +1640,7 @@
             <a:fld id="{1D8BD707-D9CF-40AE-B4C6-C98DA3205C09}" type="datetimeFigureOut">
               <a:rPr lang="en-US" smtClean="0"/>
               <a:pPr/>
-              <a:t>11/2/2020</a:t>
+              <a:t>11/3/2020</a:t>
             </a:fld>
             <a:endParaRPr lang="en-US"/>
           </a:p>
@@ -1932,7 +1932,7 @@
             <a:fld id="{1D8BD707-D9CF-40AE-B4C6-C98DA3205C09}" type="datetimeFigureOut">
               <a:rPr lang="en-US" smtClean="0"/>
               <a:pPr/>
-              <a:t>11/2/2020</a:t>
+              <a:t>11/3/2020</a:t>
             </a:fld>
             <a:endParaRPr lang="en-US"/>
           </a:p>
@@ -2358,7 +2358,7 @@
             <a:fld id="{1D8BD707-D9CF-40AE-B4C6-C98DA3205C09}" type="datetimeFigureOut">
               <a:rPr lang="en-US" smtClean="0"/>
               <a:pPr/>
-              <a:t>11/2/2020</a:t>
+              <a:t>11/3/2020</a:t>
             </a:fld>
             <a:endParaRPr lang="en-US"/>
           </a:p>
@@ -2480,7 +2480,7 @@
             <a:fld id="{1D8BD707-D9CF-40AE-B4C6-C98DA3205C09}" type="datetimeFigureOut">
               <a:rPr lang="en-US" smtClean="0"/>
               <a:pPr/>
-              <a:t>11/2/2020</a:t>
+              <a:t>11/3/2020</a:t>
             </a:fld>
             <a:endParaRPr lang="en-US"/>
           </a:p>
@@ -2579,7 +2579,7 @@
             <a:fld id="{1D8BD707-D9CF-40AE-B4C6-C98DA3205C09}" type="datetimeFigureOut">
               <a:rPr lang="en-US" smtClean="0"/>
               <a:pPr/>
-              <a:t>11/2/2020</a:t>
+              <a:t>11/3/2020</a:t>
             </a:fld>
             <a:endParaRPr lang="en-US"/>
           </a:p>
@@ -2860,7 +2860,7 @@
             <a:fld id="{1D8BD707-D9CF-40AE-B4C6-C98DA3205C09}" type="datetimeFigureOut">
               <a:rPr lang="en-US" smtClean="0"/>
               <a:pPr/>
-              <a:t>11/2/2020</a:t>
+              <a:t>11/3/2020</a:t>
             </a:fld>
             <a:endParaRPr lang="en-US"/>
           </a:p>
@@ -3117,7 +3117,7 @@
             <a:fld id="{1D8BD707-D9CF-40AE-B4C6-C98DA3205C09}" type="datetimeFigureOut">
               <a:rPr lang="en-US" smtClean="0"/>
               <a:pPr/>
-              <a:t>11/2/2020</a:t>
+              <a:t>11/3/2020</a:t>
             </a:fld>
             <a:endParaRPr lang="en-US"/>
           </a:p>
@@ -3334,7 +3334,7 @@
             <a:fld id="{1D8BD707-D9CF-40AE-B4C6-C98DA3205C09}" type="datetimeFigureOut">
               <a:rPr lang="en-US" smtClean="0"/>
               <a:pPr/>
-              <a:t>11/2/2020</a:t>
+              <a:t>11/3/2020</a:t>
             </a:fld>
             <a:endParaRPr lang="en-US"/>
           </a:p>
@@ -4314,7 +4314,7 @@
             </a:pPr>
             <a:r>
               <a:rPr lang="en-AU" sz="2800" dirty="0" smtClean="0"/>
-              <a:t>Spending funds on gathering </a:t>
+              <a:t>Allocating funds for gathering </a:t>
             </a:r>
             <a:r>
               <a:rPr lang="en-AU" sz="2800" dirty="0"/>
@@ -4343,7 +4343,7 @@
             </a:pPr>
             <a:r>
               <a:rPr lang="en-AU" sz="2800" dirty="0" smtClean="0"/>
-              <a:t>Spending funds on gathering additional evidence can mean better outcomes too</a:t>
+              <a:t>Allocating funds for gathering additional evidence can mean better outcomes too</a:t>
             </a:r>
           </a:p>
         </p:txBody>
@@ -18755,136 +18755,915 @@
           <a:chExt cx="0" cy="0"/>
         </a:xfrm>
       </p:grpSpPr>
+      <p:cxnSp>
+        <p:nvCxnSpPr>
+          <p:cNvPr id="60" name="Straight Connector 59"/>
+          <p:cNvCxnSpPr/>
+          <p:nvPr/>
+        </p:nvCxnSpPr>
+        <p:spPr>
+          <a:xfrm>
+            <a:off x="1514986" y="1251029"/>
+            <a:ext cx="0" cy="2618439"/>
+          </a:xfrm>
+          <a:prstGeom prst="line">
+            <a:avLst/>
+          </a:prstGeom>
+          <a:ln w="57150">
+            <a:solidFill>
+              <a:schemeClr val="tx1"/>
+            </a:solidFill>
+          </a:ln>
+        </p:spPr>
+        <p:style>
+          <a:lnRef idx="1">
+            <a:schemeClr val="accent1"/>
+          </a:lnRef>
+          <a:fillRef idx="0">
+            <a:schemeClr val="accent1"/>
+          </a:fillRef>
+          <a:effectRef idx="0">
+            <a:schemeClr val="accent1"/>
+          </a:effectRef>
+          <a:fontRef idx="minor">
+            <a:schemeClr val="tx1"/>
+          </a:fontRef>
+        </p:style>
+      </p:cxnSp>
+      <p:cxnSp>
+        <p:nvCxnSpPr>
+          <p:cNvPr id="62" name="Straight Connector 61"/>
+          <p:cNvCxnSpPr/>
+          <p:nvPr/>
+        </p:nvCxnSpPr>
+        <p:spPr>
+          <a:xfrm flipV="1">
+            <a:off x="1514986" y="3859755"/>
+            <a:ext cx="4612214" cy="1380"/>
+          </a:xfrm>
+          <a:prstGeom prst="line">
+            <a:avLst/>
+          </a:prstGeom>
+          <a:ln w="57150">
+            <a:solidFill>
+              <a:schemeClr val="tx1"/>
+            </a:solidFill>
+          </a:ln>
+        </p:spPr>
+        <p:style>
+          <a:lnRef idx="1">
+            <a:schemeClr val="accent1"/>
+          </a:lnRef>
+          <a:fillRef idx="0">
+            <a:schemeClr val="accent1"/>
+          </a:fillRef>
+          <a:effectRef idx="0">
+            <a:schemeClr val="accent1"/>
+          </a:effectRef>
+          <a:fontRef idx="minor">
+            <a:schemeClr val="tx1"/>
+          </a:fontRef>
+        </p:style>
+      </p:cxnSp>
+      <p:cxnSp>
+        <p:nvCxnSpPr>
+          <p:cNvPr id="2048" name="Straight Connector 2047"/>
+          <p:cNvCxnSpPr/>
+          <p:nvPr/>
+        </p:nvCxnSpPr>
+        <p:spPr>
+          <a:xfrm>
+            <a:off x="2950495" y="1251029"/>
+            <a:ext cx="37339" cy="2618439"/>
+          </a:xfrm>
+          <a:prstGeom prst="line">
+            <a:avLst/>
+          </a:prstGeom>
+          <a:ln w="57150">
+            <a:solidFill>
+              <a:schemeClr val="tx1"/>
+            </a:solidFill>
+            <a:prstDash val="dash"/>
+          </a:ln>
+        </p:spPr>
+        <p:style>
+          <a:lnRef idx="1">
+            <a:schemeClr val="accent1"/>
+          </a:lnRef>
+          <a:fillRef idx="0">
+            <a:schemeClr val="accent1"/>
+          </a:fillRef>
+          <a:effectRef idx="0">
+            <a:schemeClr val="accent1"/>
+          </a:effectRef>
+          <a:fontRef idx="minor">
+            <a:schemeClr val="tx1"/>
+          </a:fontRef>
+        </p:style>
+      </p:cxnSp>
+      <p:sp>
+        <p:nvSpPr>
+          <p:cNvPr id="2049" name="TextBox 2048"/>
+          <p:cNvSpPr txBox="1"/>
+          <p:nvPr/>
+        </p:nvSpPr>
+        <p:spPr>
+          <a:xfrm>
+            <a:off x="1997367" y="3965810"/>
+            <a:ext cx="1018227" cy="584775"/>
+          </a:xfrm>
+          <a:prstGeom prst="rect">
+            <a:avLst/>
+          </a:prstGeom>
+          <a:noFill/>
+        </p:spPr>
+        <p:txBody>
+          <a:bodyPr wrap="none" rtlCol="0">
+            <a:spAutoFit/>
+          </a:bodyPr>
+          <a:lstStyle/>
+          <a:p>
+            <a:r>
+              <a:rPr lang="en-AU" sz="3200" dirty="0" smtClean="0"/>
+              <a:t>2000</a:t>
+            </a:r>
+            <a:endParaRPr lang="en-AU" sz="3200" dirty="0"/>
+          </a:p>
+        </p:txBody>
+      </p:sp>
+      <p:sp>
+        <p:nvSpPr>
+          <p:cNvPr id="67" name="TextBox 66"/>
+          <p:cNvSpPr txBox="1"/>
+          <p:nvPr/>
+        </p:nvSpPr>
+        <p:spPr>
+          <a:xfrm>
+            <a:off x="4042551" y="3965810"/>
+            <a:ext cx="1018227" cy="584775"/>
+          </a:xfrm>
+          <a:prstGeom prst="rect">
+            <a:avLst/>
+          </a:prstGeom>
+          <a:noFill/>
+        </p:spPr>
+        <p:txBody>
+          <a:bodyPr wrap="none" rtlCol="0">
+            <a:spAutoFit/>
+          </a:bodyPr>
+          <a:lstStyle/>
+          <a:p>
+            <a:r>
+              <a:rPr lang="en-AU" sz="3200" dirty="0" smtClean="0"/>
+              <a:t>2050</a:t>
+            </a:r>
+            <a:endParaRPr lang="en-AU" sz="3200" dirty="0"/>
+          </a:p>
+        </p:txBody>
+      </p:sp>
+      <p:sp>
+        <p:nvSpPr>
+          <p:cNvPr id="68" name="TextBox 67"/>
+          <p:cNvSpPr txBox="1"/>
+          <p:nvPr/>
+        </p:nvSpPr>
+        <p:spPr>
+          <a:xfrm>
+            <a:off x="5543359" y="3965810"/>
+            <a:ext cx="1018227" cy="584775"/>
+          </a:xfrm>
+          <a:prstGeom prst="rect">
+            <a:avLst/>
+          </a:prstGeom>
+          <a:noFill/>
+        </p:spPr>
+        <p:txBody>
+          <a:bodyPr wrap="none" rtlCol="0">
+            <a:spAutoFit/>
+          </a:bodyPr>
+          <a:lstStyle/>
+          <a:p>
+            <a:r>
+              <a:rPr lang="en-AU" sz="3200" dirty="0" smtClean="0"/>
+              <a:t>2100</a:t>
+            </a:r>
+            <a:endParaRPr lang="en-AU" sz="3200" dirty="0"/>
+          </a:p>
+        </p:txBody>
+      </p:sp>
+      <p:cxnSp>
+        <p:nvCxnSpPr>
+          <p:cNvPr id="2052" name="Straight Connector 2051"/>
+          <p:cNvCxnSpPr/>
+          <p:nvPr/>
+        </p:nvCxnSpPr>
+        <p:spPr>
+          <a:xfrm>
+            <a:off x="2541944" y="3861135"/>
+            <a:ext cx="0" cy="189874"/>
+          </a:xfrm>
+          <a:prstGeom prst="line">
+            <a:avLst/>
+          </a:prstGeom>
+          <a:ln w="57150">
+            <a:solidFill>
+              <a:schemeClr val="tx1"/>
+            </a:solidFill>
+          </a:ln>
+        </p:spPr>
+        <p:style>
+          <a:lnRef idx="1">
+            <a:schemeClr val="accent1"/>
+          </a:lnRef>
+          <a:fillRef idx="0">
+            <a:schemeClr val="accent1"/>
+          </a:fillRef>
+          <a:effectRef idx="0">
+            <a:schemeClr val="accent1"/>
+          </a:effectRef>
+          <a:fontRef idx="minor">
+            <a:schemeClr val="tx1"/>
+          </a:fontRef>
+        </p:style>
+      </p:cxnSp>
+      <p:cxnSp>
+        <p:nvCxnSpPr>
+          <p:cNvPr id="16" name="Straight Connector 15"/>
+          <p:cNvCxnSpPr/>
+          <p:nvPr/>
+        </p:nvCxnSpPr>
+        <p:spPr>
+          <a:xfrm>
+            <a:off x="4551664" y="3859756"/>
+            <a:ext cx="0" cy="189874"/>
+          </a:xfrm>
+          <a:prstGeom prst="line">
+            <a:avLst/>
+          </a:prstGeom>
+          <a:ln w="57150">
+            <a:solidFill>
+              <a:schemeClr val="tx1"/>
+            </a:solidFill>
+          </a:ln>
+        </p:spPr>
+        <p:style>
+          <a:lnRef idx="1">
+            <a:schemeClr val="accent1"/>
+          </a:lnRef>
+          <a:fillRef idx="0">
+            <a:schemeClr val="accent1"/>
+          </a:fillRef>
+          <a:effectRef idx="0">
+            <a:schemeClr val="accent1"/>
+          </a:effectRef>
+          <a:fontRef idx="minor">
+            <a:schemeClr val="tx1"/>
+          </a:fontRef>
+        </p:style>
+      </p:cxnSp>
+      <p:cxnSp>
+        <p:nvCxnSpPr>
+          <p:cNvPr id="17" name="Straight Connector 16"/>
+          <p:cNvCxnSpPr/>
+          <p:nvPr/>
+        </p:nvCxnSpPr>
+        <p:spPr>
+          <a:xfrm>
+            <a:off x="6052472" y="3859756"/>
+            <a:ext cx="0" cy="189874"/>
+          </a:xfrm>
+          <a:prstGeom prst="line">
+            <a:avLst/>
+          </a:prstGeom>
+          <a:ln w="57150">
+            <a:solidFill>
+              <a:schemeClr val="tx1"/>
+            </a:solidFill>
+          </a:ln>
+        </p:spPr>
+        <p:style>
+          <a:lnRef idx="1">
+            <a:schemeClr val="accent1"/>
+          </a:lnRef>
+          <a:fillRef idx="0">
+            <a:schemeClr val="accent1"/>
+          </a:fillRef>
+          <a:effectRef idx="0">
+            <a:schemeClr val="accent1"/>
+          </a:effectRef>
+          <a:fontRef idx="minor">
+            <a:schemeClr val="tx1"/>
+          </a:fontRef>
+        </p:style>
+      </p:cxnSp>
+      <p:sp>
+        <p:nvSpPr>
+          <p:cNvPr id="14" name="TextBox 13"/>
+          <p:cNvSpPr txBox="1"/>
+          <p:nvPr/>
+        </p:nvSpPr>
+        <p:spPr>
+          <a:xfrm rot="16200000">
+            <a:off x="-550267" y="2298638"/>
+            <a:ext cx="1882182" cy="523220"/>
+          </a:xfrm>
+          <a:prstGeom prst="rect">
+            <a:avLst/>
+          </a:prstGeom>
+          <a:noFill/>
+        </p:spPr>
+        <p:txBody>
+          <a:bodyPr wrap="none" rtlCol="0">
+            <a:spAutoFit/>
+          </a:bodyPr>
+          <a:lstStyle/>
+          <a:p>
+            <a:r>
+              <a:rPr lang="en-AU" sz="2800" dirty="0" smtClean="0"/>
+              <a:t>Biodiversity</a:t>
+            </a:r>
+            <a:endParaRPr lang="en-AU" sz="2800" dirty="0"/>
+          </a:p>
+        </p:txBody>
+      </p:sp>
+      <p:sp>
+        <p:nvSpPr>
+          <p:cNvPr id="19" name="Right Arrow 18"/>
+          <p:cNvSpPr/>
+          <p:nvPr/>
+        </p:nvSpPr>
+        <p:spPr>
+          <a:xfrm rot="16200000">
+            <a:off x="446222" y="1529909"/>
+            <a:ext cx="1109187" cy="551427"/>
+          </a:xfrm>
+          <a:prstGeom prst="rightArrow">
+            <a:avLst/>
+          </a:prstGeom>
+          <a:noFill/>
+          <a:ln w="38100">
+            <a:solidFill>
+              <a:schemeClr val="tx1"/>
+            </a:solidFill>
+          </a:ln>
+        </p:spPr>
+        <p:style>
+          <a:lnRef idx="2">
+            <a:schemeClr val="accent1">
+              <a:shade val="50000"/>
+            </a:schemeClr>
+          </a:lnRef>
+          <a:fillRef idx="1">
+            <a:schemeClr val="accent1"/>
+          </a:fillRef>
+          <a:effectRef idx="0">
+            <a:schemeClr val="accent1"/>
+          </a:effectRef>
+          <a:fontRef idx="minor">
+            <a:schemeClr val="lt1"/>
+          </a:fontRef>
+        </p:style>
+        <p:txBody>
+          <a:bodyPr rtlCol="0" anchor="ctr"/>
+          <a:lstStyle/>
+          <a:p>
+            <a:pPr algn="ctr"/>
+            <a:endParaRPr lang="en-AU"/>
+          </a:p>
+        </p:txBody>
+      </p:sp>
+      <p:sp>
+        <p:nvSpPr>
+          <p:cNvPr id="32" name="Right Arrow 31"/>
+          <p:cNvSpPr/>
+          <p:nvPr/>
+        </p:nvSpPr>
+        <p:spPr>
+          <a:xfrm rot="5400000">
+            <a:off x="405111" y="2988338"/>
+            <a:ext cx="1191407" cy="551427"/>
+          </a:xfrm>
+          <a:prstGeom prst="rightArrow">
+            <a:avLst/>
+          </a:prstGeom>
+          <a:noFill/>
+          <a:ln w="38100">
+            <a:solidFill>
+              <a:schemeClr val="tx1"/>
+            </a:solidFill>
+          </a:ln>
+        </p:spPr>
+        <p:style>
+          <a:lnRef idx="2">
+            <a:schemeClr val="accent1">
+              <a:shade val="50000"/>
+            </a:schemeClr>
+          </a:lnRef>
+          <a:fillRef idx="1">
+            <a:schemeClr val="accent1"/>
+          </a:fillRef>
+          <a:effectRef idx="0">
+            <a:schemeClr val="accent1"/>
+          </a:effectRef>
+          <a:fontRef idx="minor">
+            <a:schemeClr val="lt1"/>
+          </a:fontRef>
+        </p:style>
+        <p:txBody>
+          <a:bodyPr rtlCol="0" anchor="ctr"/>
+          <a:lstStyle/>
+          <a:p>
+            <a:pPr algn="ctr"/>
+            <a:endParaRPr lang="en-AU"/>
+          </a:p>
+        </p:txBody>
+      </p:sp>
+      <p:sp>
+        <p:nvSpPr>
+          <p:cNvPr id="29" name="Freeform 28"/>
+          <p:cNvSpPr/>
+          <p:nvPr/>
+        </p:nvSpPr>
+        <p:spPr>
+          <a:xfrm>
+            <a:off x="2971687" y="2581153"/>
+            <a:ext cx="3131980" cy="1013467"/>
+          </a:xfrm>
+          <a:custGeom>
+            <a:avLst/>
+            <a:gdLst>
+              <a:gd name="connsiteX0" fmla="*/ 0 w 3599727"/>
+              <a:gd name="connsiteY0" fmla="*/ 0 h 1099595"/>
+              <a:gd name="connsiteX1" fmla="*/ 1921398 w 3599727"/>
+              <a:gd name="connsiteY1" fmla="*/ 879676 h 1099595"/>
+              <a:gd name="connsiteX2" fmla="*/ 3599727 w 3599727"/>
+              <a:gd name="connsiteY2" fmla="*/ 1099595 h 1099595"/>
+            </a:gdLst>
+            <a:ahLst/>
+            <a:cxnLst>
+              <a:cxn ang="0">
+                <a:pos x="connsiteX0" y="connsiteY0"/>
+              </a:cxn>
+              <a:cxn ang="0">
+                <a:pos x="connsiteX1" y="connsiteY1"/>
+              </a:cxn>
+              <a:cxn ang="0">
+                <a:pos x="connsiteX2" y="connsiteY2"/>
+              </a:cxn>
+            </a:cxnLst>
+            <a:rect l="l" t="t" r="r" b="b"/>
+            <a:pathLst>
+              <a:path w="3599727" h="1099595">
+                <a:moveTo>
+                  <a:pt x="0" y="0"/>
+                </a:moveTo>
+                <a:cubicBezTo>
+                  <a:pt x="660722" y="348205"/>
+                  <a:pt x="1321444" y="696410"/>
+                  <a:pt x="1921398" y="879676"/>
+                </a:cubicBezTo>
+                <a:cubicBezTo>
+                  <a:pt x="2521353" y="1062942"/>
+                  <a:pt x="3060540" y="1081268"/>
+                  <a:pt x="3599727" y="1099595"/>
+                </a:cubicBezTo>
+              </a:path>
+            </a:pathLst>
+          </a:custGeom>
+          <a:noFill/>
+          <a:ln w="57150">
+            <a:solidFill>
+              <a:srgbClr val="FF0000"/>
+            </a:solidFill>
+          </a:ln>
+        </p:spPr>
+        <p:style>
+          <a:lnRef idx="2">
+            <a:schemeClr val="accent1">
+              <a:shade val="50000"/>
+            </a:schemeClr>
+          </a:lnRef>
+          <a:fillRef idx="1">
+            <a:schemeClr val="accent1"/>
+          </a:fillRef>
+          <a:effectRef idx="0">
+            <a:schemeClr val="accent1"/>
+          </a:effectRef>
+          <a:fontRef idx="minor">
+            <a:schemeClr val="lt1"/>
+          </a:fontRef>
+        </p:style>
+        <p:txBody>
+          <a:bodyPr rtlCol="0" anchor="ctr"/>
+          <a:lstStyle/>
+          <a:p>
+            <a:pPr algn="ctr"/>
+            <a:endParaRPr lang="en-AU"/>
+          </a:p>
+        </p:txBody>
+      </p:sp>
+      <p:sp>
+        <p:nvSpPr>
+          <p:cNvPr id="34" name="Freeform 33"/>
+          <p:cNvSpPr/>
+          <p:nvPr/>
+        </p:nvSpPr>
+        <p:spPr>
+          <a:xfrm>
+            <a:off x="2971687" y="1682613"/>
+            <a:ext cx="3155514" cy="898539"/>
+          </a:xfrm>
+          <a:custGeom>
+            <a:avLst/>
+            <a:gdLst>
+              <a:gd name="connsiteX0" fmla="*/ 0 w 3692324"/>
+              <a:gd name="connsiteY0" fmla="*/ 1064871 h 1064871"/>
+              <a:gd name="connsiteX1" fmla="*/ 1620456 w 3692324"/>
+              <a:gd name="connsiteY1" fmla="*/ 729205 h 1064871"/>
+              <a:gd name="connsiteX2" fmla="*/ 2384385 w 3692324"/>
+              <a:gd name="connsiteY2" fmla="*/ 300942 h 1064871"/>
+              <a:gd name="connsiteX3" fmla="*/ 3692324 w 3692324"/>
+              <a:gd name="connsiteY3" fmla="*/ 0 h 1064871"/>
+            </a:gdLst>
+            <a:ahLst/>
+            <a:cxnLst>
+              <a:cxn ang="0">
+                <a:pos x="connsiteX0" y="connsiteY0"/>
+              </a:cxn>
+              <a:cxn ang="0">
+                <a:pos x="connsiteX1" y="connsiteY1"/>
+              </a:cxn>
+              <a:cxn ang="0">
+                <a:pos x="connsiteX2" y="connsiteY2"/>
+              </a:cxn>
+              <a:cxn ang="0">
+                <a:pos x="connsiteX3" y="connsiteY3"/>
+              </a:cxn>
+            </a:cxnLst>
+            <a:rect l="l" t="t" r="r" b="b"/>
+            <a:pathLst>
+              <a:path w="3692324" h="1064871">
+                <a:moveTo>
+                  <a:pt x="0" y="1064871"/>
+                </a:moveTo>
+                <a:cubicBezTo>
+                  <a:pt x="611529" y="960698"/>
+                  <a:pt x="1223059" y="856526"/>
+                  <a:pt x="1620456" y="729205"/>
+                </a:cubicBezTo>
+                <a:cubicBezTo>
+                  <a:pt x="2017853" y="601884"/>
+                  <a:pt x="2039074" y="422476"/>
+                  <a:pt x="2384385" y="300942"/>
+                </a:cubicBezTo>
+                <a:cubicBezTo>
+                  <a:pt x="2729696" y="179408"/>
+                  <a:pt x="3211010" y="89704"/>
+                  <a:pt x="3692324" y="0"/>
+                </a:cubicBezTo>
+              </a:path>
+            </a:pathLst>
+          </a:custGeom>
+          <a:noFill/>
+          <a:ln w="57150">
+            <a:solidFill>
+              <a:srgbClr val="00B0F0"/>
+            </a:solidFill>
+          </a:ln>
+        </p:spPr>
+        <p:style>
+          <a:lnRef idx="2">
+            <a:schemeClr val="accent1">
+              <a:shade val="50000"/>
+            </a:schemeClr>
+          </a:lnRef>
+          <a:fillRef idx="1">
+            <a:schemeClr val="accent1"/>
+          </a:fillRef>
+          <a:effectRef idx="0">
+            <a:schemeClr val="accent1"/>
+          </a:effectRef>
+          <a:fontRef idx="minor">
+            <a:schemeClr val="lt1"/>
+          </a:fontRef>
+        </p:style>
+        <p:txBody>
+          <a:bodyPr rtlCol="0" anchor="ctr"/>
+          <a:lstStyle/>
+          <a:p>
+            <a:pPr algn="ctr"/>
+            <a:endParaRPr lang="en-AU"/>
+          </a:p>
+        </p:txBody>
+      </p:sp>
+      <p:sp>
+        <p:nvSpPr>
+          <p:cNvPr id="35" name="Freeform 34"/>
+          <p:cNvSpPr/>
+          <p:nvPr/>
+        </p:nvSpPr>
+        <p:spPr>
+          <a:xfrm>
+            <a:off x="1663747" y="1805649"/>
+            <a:ext cx="1365813" cy="787079"/>
+          </a:xfrm>
+          <a:custGeom>
+            <a:avLst/>
+            <a:gdLst>
+              <a:gd name="connsiteX0" fmla="*/ 0 w 1365813"/>
+              <a:gd name="connsiteY0" fmla="*/ 0 h 787079"/>
+              <a:gd name="connsiteX1" fmla="*/ 370390 w 1365813"/>
+              <a:gd name="connsiteY1" fmla="*/ 277793 h 787079"/>
+              <a:gd name="connsiteX2" fmla="*/ 775504 w 1365813"/>
+              <a:gd name="connsiteY2" fmla="*/ 544010 h 787079"/>
+              <a:gd name="connsiteX3" fmla="*/ 1365813 w 1365813"/>
+              <a:gd name="connsiteY3" fmla="*/ 787079 h 787079"/>
+            </a:gdLst>
+            <a:ahLst/>
+            <a:cxnLst>
+              <a:cxn ang="0">
+                <a:pos x="connsiteX0" y="connsiteY0"/>
+              </a:cxn>
+              <a:cxn ang="0">
+                <a:pos x="connsiteX1" y="connsiteY1"/>
+              </a:cxn>
+              <a:cxn ang="0">
+                <a:pos x="connsiteX2" y="connsiteY2"/>
+              </a:cxn>
+              <a:cxn ang="0">
+                <a:pos x="connsiteX3" y="connsiteY3"/>
+              </a:cxn>
+            </a:cxnLst>
+            <a:rect l="l" t="t" r="r" b="b"/>
+            <a:pathLst>
+              <a:path w="1365813" h="787079">
+                <a:moveTo>
+                  <a:pt x="0" y="0"/>
+                </a:moveTo>
+                <a:cubicBezTo>
+                  <a:pt x="120569" y="93562"/>
+                  <a:pt x="241139" y="187125"/>
+                  <a:pt x="370390" y="277793"/>
+                </a:cubicBezTo>
+                <a:cubicBezTo>
+                  <a:pt x="499641" y="368461"/>
+                  <a:pt x="609600" y="459129"/>
+                  <a:pt x="775504" y="544010"/>
+                </a:cubicBezTo>
+                <a:cubicBezTo>
+                  <a:pt x="941408" y="628891"/>
+                  <a:pt x="1153610" y="707985"/>
+                  <a:pt x="1365813" y="787079"/>
+                </a:cubicBezTo>
+              </a:path>
+            </a:pathLst>
+          </a:custGeom>
+          <a:noFill/>
+          <a:ln w="57150">
+            <a:solidFill>
+              <a:srgbClr val="FFC000"/>
+            </a:solidFill>
+          </a:ln>
+        </p:spPr>
+        <p:style>
+          <a:lnRef idx="2">
+            <a:schemeClr val="accent1">
+              <a:shade val="50000"/>
+            </a:schemeClr>
+          </a:lnRef>
+          <a:fillRef idx="1">
+            <a:schemeClr val="accent1"/>
+          </a:fillRef>
+          <a:effectRef idx="0">
+            <a:schemeClr val="accent1"/>
+          </a:effectRef>
+          <a:fontRef idx="minor">
+            <a:schemeClr val="lt1"/>
+          </a:fontRef>
+        </p:style>
+        <p:txBody>
+          <a:bodyPr rtlCol="0" anchor="ctr"/>
+          <a:lstStyle/>
+          <a:p>
+            <a:pPr algn="ctr"/>
+            <a:endParaRPr lang="en-AU"/>
+          </a:p>
+        </p:txBody>
+      </p:sp>
+      <p:sp>
+        <p:nvSpPr>
+          <p:cNvPr id="21" name="Freeform 20"/>
+          <p:cNvSpPr/>
+          <p:nvPr/>
+        </p:nvSpPr>
+        <p:spPr>
+          <a:xfrm>
+            <a:off x="2950493" y="2282400"/>
+            <a:ext cx="3176707" cy="296643"/>
+          </a:xfrm>
+          <a:custGeom>
+            <a:avLst/>
+            <a:gdLst>
+              <a:gd name="connsiteX0" fmla="*/ 0 w 3692324"/>
+              <a:gd name="connsiteY0" fmla="*/ 1064871 h 1064871"/>
+              <a:gd name="connsiteX1" fmla="*/ 1620456 w 3692324"/>
+              <a:gd name="connsiteY1" fmla="*/ 729205 h 1064871"/>
+              <a:gd name="connsiteX2" fmla="*/ 2384385 w 3692324"/>
+              <a:gd name="connsiteY2" fmla="*/ 300942 h 1064871"/>
+              <a:gd name="connsiteX3" fmla="*/ 3692324 w 3692324"/>
+              <a:gd name="connsiteY3" fmla="*/ 0 h 1064871"/>
+            </a:gdLst>
+            <a:ahLst/>
+            <a:cxnLst>
+              <a:cxn ang="0">
+                <a:pos x="connsiteX0" y="connsiteY0"/>
+              </a:cxn>
+              <a:cxn ang="0">
+                <a:pos x="connsiteX1" y="connsiteY1"/>
+              </a:cxn>
+              <a:cxn ang="0">
+                <a:pos x="connsiteX2" y="connsiteY2"/>
+              </a:cxn>
+              <a:cxn ang="0">
+                <a:pos x="connsiteX3" y="connsiteY3"/>
+              </a:cxn>
+            </a:cxnLst>
+            <a:rect l="l" t="t" r="r" b="b"/>
+            <a:pathLst>
+              <a:path w="3692324" h="1064871">
+                <a:moveTo>
+                  <a:pt x="0" y="1064871"/>
+                </a:moveTo>
+                <a:cubicBezTo>
+                  <a:pt x="611529" y="960698"/>
+                  <a:pt x="1223059" y="856526"/>
+                  <a:pt x="1620456" y="729205"/>
+                </a:cubicBezTo>
+                <a:cubicBezTo>
+                  <a:pt x="2017853" y="601884"/>
+                  <a:pt x="2039074" y="422476"/>
+                  <a:pt x="2384385" y="300942"/>
+                </a:cubicBezTo>
+                <a:cubicBezTo>
+                  <a:pt x="2729696" y="179408"/>
+                  <a:pt x="3211010" y="89704"/>
+                  <a:pt x="3692324" y="0"/>
+                </a:cubicBezTo>
+              </a:path>
+            </a:pathLst>
+          </a:custGeom>
+          <a:noFill/>
+          <a:ln w="57150">
+            <a:solidFill>
+              <a:srgbClr val="00B0F0"/>
+            </a:solidFill>
+            <a:prstDash val="sysDash"/>
+          </a:ln>
+        </p:spPr>
+        <p:style>
+          <a:lnRef idx="2">
+            <a:schemeClr val="accent1">
+              <a:shade val="50000"/>
+            </a:schemeClr>
+          </a:lnRef>
+          <a:fillRef idx="1">
+            <a:schemeClr val="accent1"/>
+          </a:fillRef>
+          <a:effectRef idx="0">
+            <a:schemeClr val="accent1"/>
+          </a:effectRef>
+          <a:fontRef idx="minor">
+            <a:schemeClr val="lt1"/>
+          </a:fontRef>
+        </p:style>
+        <p:txBody>
+          <a:bodyPr rtlCol="0" anchor="ctr"/>
+          <a:lstStyle/>
+          <a:p>
+            <a:pPr algn="ctr"/>
+            <a:endParaRPr lang="en-AU"/>
+          </a:p>
+        </p:txBody>
+      </p:sp>
+      <p:sp>
+        <p:nvSpPr>
+          <p:cNvPr id="22" name="Freeform 21"/>
+          <p:cNvSpPr/>
+          <p:nvPr/>
+        </p:nvSpPr>
+        <p:spPr>
+          <a:xfrm flipV="1">
+            <a:off x="2950494" y="2572822"/>
+            <a:ext cx="3143704" cy="451078"/>
+          </a:xfrm>
+          <a:custGeom>
+            <a:avLst/>
+            <a:gdLst>
+              <a:gd name="connsiteX0" fmla="*/ 0 w 3692324"/>
+              <a:gd name="connsiteY0" fmla="*/ 1064871 h 1064871"/>
+              <a:gd name="connsiteX1" fmla="*/ 1620456 w 3692324"/>
+              <a:gd name="connsiteY1" fmla="*/ 729205 h 1064871"/>
+              <a:gd name="connsiteX2" fmla="*/ 2384385 w 3692324"/>
+              <a:gd name="connsiteY2" fmla="*/ 300942 h 1064871"/>
+              <a:gd name="connsiteX3" fmla="*/ 3692324 w 3692324"/>
+              <a:gd name="connsiteY3" fmla="*/ 0 h 1064871"/>
+            </a:gdLst>
+            <a:ahLst/>
+            <a:cxnLst>
+              <a:cxn ang="0">
+                <a:pos x="connsiteX0" y="connsiteY0"/>
+              </a:cxn>
+              <a:cxn ang="0">
+                <a:pos x="connsiteX1" y="connsiteY1"/>
+              </a:cxn>
+              <a:cxn ang="0">
+                <a:pos x="connsiteX2" y="connsiteY2"/>
+              </a:cxn>
+              <a:cxn ang="0">
+                <a:pos x="connsiteX3" y="connsiteY3"/>
+              </a:cxn>
+            </a:cxnLst>
+            <a:rect l="l" t="t" r="r" b="b"/>
+            <a:pathLst>
+              <a:path w="3692324" h="1064871">
+                <a:moveTo>
+                  <a:pt x="0" y="1064871"/>
+                </a:moveTo>
+                <a:cubicBezTo>
+                  <a:pt x="611529" y="960698"/>
+                  <a:pt x="1223059" y="856526"/>
+                  <a:pt x="1620456" y="729205"/>
+                </a:cubicBezTo>
+                <a:cubicBezTo>
+                  <a:pt x="2017853" y="601884"/>
+                  <a:pt x="2039074" y="422476"/>
+                  <a:pt x="2384385" y="300942"/>
+                </a:cubicBezTo>
+                <a:cubicBezTo>
+                  <a:pt x="2729696" y="179408"/>
+                  <a:pt x="3211010" y="89704"/>
+                  <a:pt x="3692324" y="0"/>
+                </a:cubicBezTo>
+              </a:path>
+            </a:pathLst>
+          </a:custGeom>
+          <a:noFill/>
+          <a:ln w="57150">
+            <a:solidFill>
+              <a:srgbClr val="00B0F0"/>
+            </a:solidFill>
+            <a:prstDash val="sysDot"/>
+          </a:ln>
+        </p:spPr>
+        <p:style>
+          <a:lnRef idx="2">
+            <a:schemeClr val="accent1">
+              <a:shade val="50000"/>
+            </a:schemeClr>
+          </a:lnRef>
+          <a:fillRef idx="1">
+            <a:schemeClr val="accent1"/>
+          </a:fillRef>
+          <a:effectRef idx="0">
+            <a:schemeClr val="accent1"/>
+          </a:effectRef>
+          <a:fontRef idx="minor">
+            <a:schemeClr val="lt1"/>
+          </a:fontRef>
+        </p:style>
+        <p:txBody>
+          <a:bodyPr rtlCol="0" anchor="ctr"/>
+          <a:lstStyle/>
+          <a:p>
+            <a:pPr algn="ctr"/>
+            <a:endParaRPr lang="en-AU"/>
+          </a:p>
+        </p:txBody>
+      </p:sp>
       <p:grpSp>
         <p:nvGrpSpPr>
-          <p:cNvPr id="36" name="Group 35"/>
+          <p:cNvPr id="9" name="Group 8"/>
           <p:cNvGrpSpPr/>
           <p:nvPr/>
         </p:nvGrpSpPr>
         <p:grpSpPr>
           <a:xfrm>
-            <a:off x="410014" y="1251029"/>
-            <a:ext cx="6684372" cy="3299556"/>
-            <a:chOff x="838277" y="533400"/>
-            <a:chExt cx="6684372" cy="3299556"/>
+            <a:off x="6028941" y="1337889"/>
+            <a:ext cx="2704010" cy="2507208"/>
+            <a:chOff x="6028941" y="1337889"/>
+            <a:chExt cx="2704010" cy="2507208"/>
           </a:xfrm>
         </p:grpSpPr>
-        <p:cxnSp>
-          <p:nvCxnSpPr>
-            <p:cNvPr id="60" name="Straight Connector 59"/>
-            <p:cNvCxnSpPr/>
-            <p:nvPr/>
-          </p:nvCxnSpPr>
-          <p:spPr>
-            <a:xfrm>
-              <a:off x="2224049" y="533400"/>
-              <a:ext cx="0" cy="2618439"/>
-            </a:xfrm>
-            <a:prstGeom prst="line">
-              <a:avLst/>
-            </a:prstGeom>
-            <a:ln w="57150">
-              <a:solidFill>
-                <a:schemeClr val="tx1"/>
-              </a:solidFill>
-            </a:ln>
-          </p:spPr>
-          <p:style>
-            <a:lnRef idx="1">
-              <a:schemeClr val="accent1"/>
-            </a:lnRef>
-            <a:fillRef idx="0">
-              <a:schemeClr val="accent1"/>
-            </a:fillRef>
-            <a:effectRef idx="0">
-              <a:schemeClr val="accent1"/>
-            </a:effectRef>
-            <a:fontRef idx="minor">
-              <a:schemeClr val="tx1"/>
-            </a:fontRef>
-          </p:style>
-        </p:cxnSp>
-        <p:cxnSp>
-          <p:nvCxnSpPr>
-            <p:cNvPr id="62" name="Straight Connector 61"/>
-            <p:cNvCxnSpPr/>
-            <p:nvPr/>
-          </p:nvCxnSpPr>
-          <p:spPr>
-            <a:xfrm>
-              <a:off x="2224049" y="3143506"/>
-              <a:ext cx="5060671" cy="0"/>
-            </a:xfrm>
-            <a:prstGeom prst="line">
-              <a:avLst/>
-            </a:prstGeom>
-            <a:ln w="57150">
-              <a:solidFill>
-                <a:schemeClr val="tx1"/>
-              </a:solidFill>
-            </a:ln>
-          </p:spPr>
-          <p:style>
-            <a:lnRef idx="1">
-              <a:schemeClr val="accent1"/>
-            </a:lnRef>
-            <a:fillRef idx="0">
-              <a:schemeClr val="accent1"/>
-            </a:fillRef>
-            <a:effectRef idx="0">
-              <a:schemeClr val="accent1"/>
-            </a:effectRef>
-            <a:fontRef idx="minor">
-              <a:schemeClr val="tx1"/>
-            </a:fontRef>
-          </p:style>
-        </p:cxnSp>
-        <p:cxnSp>
-          <p:nvCxnSpPr>
-            <p:cNvPr id="2048" name="Straight Connector 2047"/>
-            <p:cNvCxnSpPr/>
-            <p:nvPr/>
-          </p:nvCxnSpPr>
-          <p:spPr>
-            <a:xfrm>
-              <a:off x="3659558" y="533400"/>
-              <a:ext cx="37339" cy="2618439"/>
-            </a:xfrm>
-            <a:prstGeom prst="line">
-              <a:avLst/>
-            </a:prstGeom>
-            <a:ln w="57150">
-              <a:solidFill>
-                <a:schemeClr val="tx1"/>
-              </a:solidFill>
-              <a:prstDash val="dash"/>
-            </a:ln>
-          </p:spPr>
-          <p:style>
-            <a:lnRef idx="1">
-              <a:schemeClr val="accent1"/>
-            </a:lnRef>
-            <a:fillRef idx="0">
-              <a:schemeClr val="accent1"/>
-            </a:fillRef>
-            <a:effectRef idx="0">
-              <a:schemeClr val="accent1"/>
-            </a:effectRef>
-            <a:fontRef idx="minor">
-              <a:schemeClr val="tx1"/>
-            </a:fontRef>
-          </p:style>
-        </p:cxnSp>
         <p:sp>
           <p:nvSpPr>
-            <p:cNvPr id="2049" name="TextBox 2048"/>
+            <p:cNvPr id="37" name="TextBox 36"/>
             <p:cNvSpPr txBox="1"/>
             <p:nvPr/>
           </p:nvSpPr>
           <p:spPr>
             <a:xfrm>
-              <a:off x="2706430" y="3248181"/>
-              <a:ext cx="1018227" cy="584775"/>
+              <a:off x="6028941" y="3260322"/>
+              <a:ext cx="2230099" cy="584775"/>
             </a:xfrm>
             <a:prstGeom prst="rect">
               <a:avLst/>
@@ -18897,9 +19676,10 @@
             </a:bodyPr>
             <a:lstStyle/>
             <a:p>
+              <a:pPr algn="ctr"/>
               <a:r>
                 <a:rPr lang="en-AU" sz="3200" dirty="0" smtClean="0"/>
-                <a:t>2000</a:t>
+                <a:t>Do nothing?</a:t>
               </a:r>
               <a:endParaRPr lang="en-AU" sz="3200" dirty="0"/>
             </a:p>
@@ -18907,14 +19687,14 @@
         </p:sp>
         <p:sp>
           <p:nvSpPr>
-            <p:cNvPr id="67" name="TextBox 66"/>
+            <p:cNvPr id="49" name="TextBox 48"/>
             <p:cNvSpPr txBox="1"/>
             <p:nvPr/>
           </p:nvSpPr>
           <p:spPr>
             <a:xfrm>
-              <a:off x="4751614" y="3248181"/>
-              <a:ext cx="1018227" cy="584775"/>
+              <a:off x="6028941" y="1337889"/>
+              <a:ext cx="2704010" cy="584775"/>
             </a:xfrm>
             <a:prstGeom prst="rect">
               <a:avLst/>
@@ -18927,9 +19707,10 @@
             </a:bodyPr>
             <a:lstStyle/>
             <a:p>
+              <a:pPr algn="ctr"/>
               <a:r>
                 <a:rPr lang="en-AU" sz="3200" dirty="0" smtClean="0"/>
-                <a:t>2050</a:t>
+                <a:t>Do something?</a:t>
               </a:r>
               <a:endParaRPr lang="en-AU" sz="3200" dirty="0"/>
             </a:p>
@@ -18937,14 +19718,14 @@
         </p:sp>
         <p:sp>
           <p:nvSpPr>
-            <p:cNvPr id="68" name="TextBox 67"/>
+            <p:cNvPr id="30" name="TextBox 29"/>
             <p:cNvSpPr txBox="1"/>
             <p:nvPr/>
           </p:nvSpPr>
           <p:spPr>
             <a:xfrm>
-              <a:off x="6504422" y="3248181"/>
-              <a:ext cx="1018227" cy="584775"/>
+              <a:off x="6028941" y="1962374"/>
+              <a:ext cx="2704010" cy="584775"/>
             </a:xfrm>
             <a:prstGeom prst="rect">
               <a:avLst/>
@@ -18957,129 +19738,25 @@
             </a:bodyPr>
             <a:lstStyle/>
             <a:p>
+              <a:pPr algn="ctr"/>
               <a:r>
                 <a:rPr lang="en-AU" sz="3200" dirty="0" smtClean="0"/>
-                <a:t>2100</a:t>
+                <a:t>Do something?</a:t>
               </a:r>
               <a:endParaRPr lang="en-AU" sz="3200" dirty="0"/>
             </a:p>
           </p:txBody>
         </p:sp>
-        <p:cxnSp>
-          <p:nvCxnSpPr>
-            <p:cNvPr id="2052" name="Straight Connector 2051"/>
-            <p:cNvCxnSpPr/>
-            <p:nvPr/>
-          </p:nvCxnSpPr>
-          <p:spPr>
-            <a:xfrm>
-              <a:off x="3251007" y="3143506"/>
-              <a:ext cx="0" cy="189874"/>
-            </a:xfrm>
-            <a:prstGeom prst="line">
-              <a:avLst/>
-            </a:prstGeom>
-            <a:ln w="57150">
-              <a:solidFill>
-                <a:schemeClr val="tx1"/>
-              </a:solidFill>
-            </a:ln>
-          </p:spPr>
-          <p:style>
-            <a:lnRef idx="1">
-              <a:schemeClr val="accent1"/>
-            </a:lnRef>
-            <a:fillRef idx="0">
-              <a:schemeClr val="accent1"/>
-            </a:fillRef>
-            <a:effectRef idx="0">
-              <a:schemeClr val="accent1"/>
-            </a:effectRef>
-            <a:fontRef idx="minor">
-              <a:schemeClr val="tx1"/>
-            </a:fontRef>
-          </p:style>
-        </p:cxnSp>
-        <p:cxnSp>
-          <p:nvCxnSpPr>
-            <p:cNvPr id="16" name="Straight Connector 15"/>
-            <p:cNvCxnSpPr/>
-            <p:nvPr/>
-          </p:nvCxnSpPr>
-          <p:spPr>
-            <a:xfrm>
-              <a:off x="5260727" y="3142127"/>
-              <a:ext cx="0" cy="189874"/>
-            </a:xfrm>
-            <a:prstGeom prst="line">
-              <a:avLst/>
-            </a:prstGeom>
-            <a:ln w="57150">
-              <a:solidFill>
-                <a:schemeClr val="tx1"/>
-              </a:solidFill>
-            </a:ln>
-          </p:spPr>
-          <p:style>
-            <a:lnRef idx="1">
-              <a:schemeClr val="accent1"/>
-            </a:lnRef>
-            <a:fillRef idx="0">
-              <a:schemeClr val="accent1"/>
-            </a:fillRef>
-            <a:effectRef idx="0">
-              <a:schemeClr val="accent1"/>
-            </a:effectRef>
-            <a:fontRef idx="minor">
-              <a:schemeClr val="tx1"/>
-            </a:fontRef>
-          </p:style>
-        </p:cxnSp>
-        <p:cxnSp>
-          <p:nvCxnSpPr>
-            <p:cNvPr id="17" name="Straight Connector 16"/>
-            <p:cNvCxnSpPr/>
-            <p:nvPr/>
-          </p:nvCxnSpPr>
-          <p:spPr>
-            <a:xfrm>
-              <a:off x="7013535" y="3142127"/>
-              <a:ext cx="0" cy="189874"/>
-            </a:xfrm>
-            <a:prstGeom prst="line">
-              <a:avLst/>
-            </a:prstGeom>
-            <a:ln w="57150">
-              <a:solidFill>
-                <a:schemeClr val="tx1"/>
-              </a:solidFill>
-            </a:ln>
-          </p:spPr>
-          <p:style>
-            <a:lnRef idx="1">
-              <a:schemeClr val="accent1"/>
-            </a:lnRef>
-            <a:fillRef idx="0">
-              <a:schemeClr val="accent1"/>
-            </a:fillRef>
-            <a:effectRef idx="0">
-              <a:schemeClr val="accent1"/>
-            </a:effectRef>
-            <a:fontRef idx="minor">
-              <a:schemeClr val="tx1"/>
-            </a:fontRef>
-          </p:style>
-        </p:cxnSp>
         <p:sp>
           <p:nvSpPr>
-            <p:cNvPr id="14" name="TextBox 13"/>
+            <p:cNvPr id="31" name="TextBox 30"/>
             <p:cNvSpPr txBox="1"/>
             <p:nvPr/>
           </p:nvSpPr>
           <p:spPr>
-            <a:xfrm rot="16200000">
-              <a:off x="158796" y="1581009"/>
-              <a:ext cx="1882182" cy="523220"/>
+            <a:xfrm>
+              <a:off x="6028941" y="2731512"/>
+              <a:ext cx="2704010" cy="584775"/>
             </a:xfrm>
             <a:prstGeom prst="rect">
               <a:avLst/>
@@ -19092,389 +19769,26 @@
             </a:bodyPr>
             <a:lstStyle/>
             <a:p>
+              <a:pPr algn="ctr"/>
               <a:r>
-                <a:rPr lang="en-AU" sz="2800" dirty="0" smtClean="0"/>
-                <a:t>Biodiversity</a:t>
+                <a:rPr lang="en-AU" sz="3200" dirty="0" smtClean="0"/>
+                <a:t>Do something?</a:t>
               </a:r>
-              <a:endParaRPr lang="en-AU" sz="2800" dirty="0"/>
-            </a:p>
-          </p:txBody>
-        </p:sp>
-        <p:sp>
-          <p:nvSpPr>
-            <p:cNvPr id="19" name="Right Arrow 18"/>
-            <p:cNvSpPr/>
-            <p:nvPr/>
-          </p:nvSpPr>
-          <p:spPr>
-            <a:xfrm rot="16200000">
-              <a:off x="1155285" y="812280"/>
-              <a:ext cx="1109187" cy="551427"/>
-            </a:xfrm>
-            <a:prstGeom prst="rightArrow">
-              <a:avLst/>
-            </a:prstGeom>
-            <a:noFill/>
-            <a:ln w="38100">
-              <a:solidFill>
-                <a:schemeClr val="tx1"/>
-              </a:solidFill>
-            </a:ln>
-          </p:spPr>
-          <p:style>
-            <a:lnRef idx="2">
-              <a:schemeClr val="accent1">
-                <a:shade val="50000"/>
-              </a:schemeClr>
-            </a:lnRef>
-            <a:fillRef idx="1">
-              <a:schemeClr val="accent1"/>
-            </a:fillRef>
-            <a:effectRef idx="0">
-              <a:schemeClr val="accent1"/>
-            </a:effectRef>
-            <a:fontRef idx="minor">
-              <a:schemeClr val="lt1"/>
-            </a:fontRef>
-          </p:style>
-          <p:txBody>
-            <a:bodyPr rtlCol="0" anchor="ctr"/>
-            <a:lstStyle/>
-            <a:p>
-              <a:pPr algn="ctr"/>
-              <a:endParaRPr lang="en-AU"/>
-            </a:p>
-          </p:txBody>
-        </p:sp>
-        <p:sp>
-          <p:nvSpPr>
-            <p:cNvPr id="32" name="Right Arrow 31"/>
-            <p:cNvSpPr/>
-            <p:nvPr/>
-          </p:nvSpPr>
-          <p:spPr>
-            <a:xfrm rot="5400000">
-              <a:off x="1114174" y="2270709"/>
-              <a:ext cx="1191407" cy="551427"/>
-            </a:xfrm>
-            <a:prstGeom prst="rightArrow">
-              <a:avLst/>
-            </a:prstGeom>
-            <a:noFill/>
-            <a:ln w="38100">
-              <a:solidFill>
-                <a:schemeClr val="tx1"/>
-              </a:solidFill>
-            </a:ln>
-          </p:spPr>
-          <p:style>
-            <a:lnRef idx="2">
-              <a:schemeClr val="accent1">
-                <a:shade val="50000"/>
-              </a:schemeClr>
-            </a:lnRef>
-            <a:fillRef idx="1">
-              <a:schemeClr val="accent1"/>
-            </a:fillRef>
-            <a:effectRef idx="0">
-              <a:schemeClr val="accent1"/>
-            </a:effectRef>
-            <a:fontRef idx="minor">
-              <a:schemeClr val="lt1"/>
-            </a:fontRef>
-          </p:style>
-          <p:txBody>
-            <a:bodyPr rtlCol="0" anchor="ctr"/>
-            <a:lstStyle/>
-            <a:p>
-              <a:pPr algn="ctr"/>
-              <a:endParaRPr lang="en-AU"/>
-            </a:p>
-          </p:txBody>
-        </p:sp>
-        <p:sp>
-          <p:nvSpPr>
-            <p:cNvPr id="29" name="Freeform 28"/>
-            <p:cNvSpPr/>
-            <p:nvPr/>
-          </p:nvSpPr>
-          <p:spPr>
-            <a:xfrm>
-              <a:off x="3680749" y="1875099"/>
-              <a:ext cx="3599727" cy="1099595"/>
-            </a:xfrm>
-            <a:custGeom>
-              <a:avLst/>
-              <a:gdLst>
-                <a:gd name="connsiteX0" fmla="*/ 0 w 3599727"/>
-                <a:gd name="connsiteY0" fmla="*/ 0 h 1099595"/>
-                <a:gd name="connsiteX1" fmla="*/ 1921398 w 3599727"/>
-                <a:gd name="connsiteY1" fmla="*/ 879676 h 1099595"/>
-                <a:gd name="connsiteX2" fmla="*/ 3599727 w 3599727"/>
-                <a:gd name="connsiteY2" fmla="*/ 1099595 h 1099595"/>
-              </a:gdLst>
-              <a:ahLst/>
-              <a:cxnLst>
-                <a:cxn ang="0">
-                  <a:pos x="connsiteX0" y="connsiteY0"/>
-                </a:cxn>
-                <a:cxn ang="0">
-                  <a:pos x="connsiteX1" y="connsiteY1"/>
-                </a:cxn>
-                <a:cxn ang="0">
-                  <a:pos x="connsiteX2" y="connsiteY2"/>
-                </a:cxn>
-              </a:cxnLst>
-              <a:rect l="l" t="t" r="r" b="b"/>
-              <a:pathLst>
-                <a:path w="3599727" h="1099595">
-                  <a:moveTo>
-                    <a:pt x="0" y="0"/>
-                  </a:moveTo>
-                  <a:cubicBezTo>
-                    <a:pt x="660722" y="348205"/>
-                    <a:pt x="1321444" y="696410"/>
-                    <a:pt x="1921398" y="879676"/>
-                  </a:cubicBezTo>
-                  <a:cubicBezTo>
-                    <a:pt x="2521353" y="1062942"/>
-                    <a:pt x="3060540" y="1081268"/>
-                    <a:pt x="3599727" y="1099595"/>
-                  </a:cubicBezTo>
-                </a:path>
-              </a:pathLst>
-            </a:custGeom>
-            <a:noFill/>
-            <a:ln w="57150">
-              <a:solidFill>
-                <a:srgbClr val="FF0000"/>
-              </a:solidFill>
-            </a:ln>
-          </p:spPr>
-          <p:style>
-            <a:lnRef idx="2">
-              <a:schemeClr val="accent1">
-                <a:shade val="50000"/>
-              </a:schemeClr>
-            </a:lnRef>
-            <a:fillRef idx="1">
-              <a:schemeClr val="accent1"/>
-            </a:fillRef>
-            <a:effectRef idx="0">
-              <a:schemeClr val="accent1"/>
-            </a:effectRef>
-            <a:fontRef idx="minor">
-              <a:schemeClr val="lt1"/>
-            </a:fontRef>
-          </p:style>
-          <p:txBody>
-            <a:bodyPr rtlCol="0" anchor="ctr"/>
-            <a:lstStyle/>
-            <a:p>
-              <a:pPr algn="ctr"/>
-              <a:endParaRPr lang="en-AU"/>
-            </a:p>
-          </p:txBody>
-        </p:sp>
-        <p:sp>
-          <p:nvSpPr>
-            <p:cNvPr id="34" name="Freeform 33"/>
-            <p:cNvSpPr/>
-            <p:nvPr/>
-          </p:nvSpPr>
-          <p:spPr>
-            <a:xfrm>
-              <a:off x="3680749" y="798653"/>
-              <a:ext cx="3692324" cy="1064871"/>
-            </a:xfrm>
-            <a:custGeom>
-              <a:avLst/>
-              <a:gdLst>
-                <a:gd name="connsiteX0" fmla="*/ 0 w 3692324"/>
-                <a:gd name="connsiteY0" fmla="*/ 1064871 h 1064871"/>
-                <a:gd name="connsiteX1" fmla="*/ 1620456 w 3692324"/>
-                <a:gd name="connsiteY1" fmla="*/ 729205 h 1064871"/>
-                <a:gd name="connsiteX2" fmla="*/ 2384385 w 3692324"/>
-                <a:gd name="connsiteY2" fmla="*/ 300942 h 1064871"/>
-                <a:gd name="connsiteX3" fmla="*/ 3692324 w 3692324"/>
-                <a:gd name="connsiteY3" fmla="*/ 0 h 1064871"/>
-              </a:gdLst>
-              <a:ahLst/>
-              <a:cxnLst>
-                <a:cxn ang="0">
-                  <a:pos x="connsiteX0" y="connsiteY0"/>
-                </a:cxn>
-                <a:cxn ang="0">
-                  <a:pos x="connsiteX1" y="connsiteY1"/>
-                </a:cxn>
-                <a:cxn ang="0">
-                  <a:pos x="connsiteX2" y="connsiteY2"/>
-                </a:cxn>
-                <a:cxn ang="0">
-                  <a:pos x="connsiteX3" y="connsiteY3"/>
-                </a:cxn>
-              </a:cxnLst>
-              <a:rect l="l" t="t" r="r" b="b"/>
-              <a:pathLst>
-                <a:path w="3692324" h="1064871">
-                  <a:moveTo>
-                    <a:pt x="0" y="1064871"/>
-                  </a:moveTo>
-                  <a:cubicBezTo>
-                    <a:pt x="611529" y="960698"/>
-                    <a:pt x="1223059" y="856526"/>
-                    <a:pt x="1620456" y="729205"/>
-                  </a:cubicBezTo>
-                  <a:cubicBezTo>
-                    <a:pt x="2017853" y="601884"/>
-                    <a:pt x="2039074" y="422476"/>
-                    <a:pt x="2384385" y="300942"/>
-                  </a:cubicBezTo>
-                  <a:cubicBezTo>
-                    <a:pt x="2729696" y="179408"/>
-                    <a:pt x="3211010" y="89704"/>
-                    <a:pt x="3692324" y="0"/>
-                  </a:cubicBezTo>
-                </a:path>
-              </a:pathLst>
-            </a:custGeom>
-            <a:noFill/>
-            <a:ln w="57150">
-              <a:solidFill>
-                <a:srgbClr val="00B0F0"/>
-              </a:solidFill>
-            </a:ln>
-          </p:spPr>
-          <p:style>
-            <a:lnRef idx="2">
-              <a:schemeClr val="accent1">
-                <a:shade val="50000"/>
-              </a:schemeClr>
-            </a:lnRef>
-            <a:fillRef idx="1">
-              <a:schemeClr val="accent1"/>
-            </a:fillRef>
-            <a:effectRef idx="0">
-              <a:schemeClr val="accent1"/>
-            </a:effectRef>
-            <a:fontRef idx="minor">
-              <a:schemeClr val="lt1"/>
-            </a:fontRef>
-          </p:style>
-          <p:txBody>
-            <a:bodyPr rtlCol="0" anchor="ctr"/>
-            <a:lstStyle/>
-            <a:p>
-              <a:pPr algn="ctr"/>
-              <a:endParaRPr lang="en-AU"/>
-            </a:p>
-          </p:txBody>
-        </p:sp>
-        <p:sp>
-          <p:nvSpPr>
-            <p:cNvPr id="35" name="Freeform 34"/>
-            <p:cNvSpPr/>
-            <p:nvPr/>
-          </p:nvSpPr>
-          <p:spPr>
-            <a:xfrm>
-              <a:off x="2372810" y="1088020"/>
-              <a:ext cx="1365813" cy="787079"/>
-            </a:xfrm>
-            <a:custGeom>
-              <a:avLst/>
-              <a:gdLst>
-                <a:gd name="connsiteX0" fmla="*/ 0 w 1365813"/>
-                <a:gd name="connsiteY0" fmla="*/ 0 h 787079"/>
-                <a:gd name="connsiteX1" fmla="*/ 370390 w 1365813"/>
-                <a:gd name="connsiteY1" fmla="*/ 277793 h 787079"/>
-                <a:gd name="connsiteX2" fmla="*/ 775504 w 1365813"/>
-                <a:gd name="connsiteY2" fmla="*/ 544010 h 787079"/>
-                <a:gd name="connsiteX3" fmla="*/ 1365813 w 1365813"/>
-                <a:gd name="connsiteY3" fmla="*/ 787079 h 787079"/>
-              </a:gdLst>
-              <a:ahLst/>
-              <a:cxnLst>
-                <a:cxn ang="0">
-                  <a:pos x="connsiteX0" y="connsiteY0"/>
-                </a:cxn>
-                <a:cxn ang="0">
-                  <a:pos x="connsiteX1" y="connsiteY1"/>
-                </a:cxn>
-                <a:cxn ang="0">
-                  <a:pos x="connsiteX2" y="connsiteY2"/>
-                </a:cxn>
-                <a:cxn ang="0">
-                  <a:pos x="connsiteX3" y="connsiteY3"/>
-                </a:cxn>
-              </a:cxnLst>
-              <a:rect l="l" t="t" r="r" b="b"/>
-              <a:pathLst>
-                <a:path w="1365813" h="787079">
-                  <a:moveTo>
-                    <a:pt x="0" y="0"/>
-                  </a:moveTo>
-                  <a:cubicBezTo>
-                    <a:pt x="120569" y="93562"/>
-                    <a:pt x="241139" y="187125"/>
-                    <a:pt x="370390" y="277793"/>
-                  </a:cubicBezTo>
-                  <a:cubicBezTo>
-                    <a:pt x="499641" y="368461"/>
-                    <a:pt x="609600" y="459129"/>
-                    <a:pt x="775504" y="544010"/>
-                  </a:cubicBezTo>
-                  <a:cubicBezTo>
-                    <a:pt x="941408" y="628891"/>
-                    <a:pt x="1153610" y="707985"/>
-                    <a:pt x="1365813" y="787079"/>
-                  </a:cubicBezTo>
-                </a:path>
-              </a:pathLst>
-            </a:custGeom>
-            <a:noFill/>
-            <a:ln w="57150">
-              <a:solidFill>
-                <a:srgbClr val="FFC000"/>
-              </a:solidFill>
-            </a:ln>
-          </p:spPr>
-          <p:style>
-            <a:lnRef idx="2">
-              <a:schemeClr val="accent1">
-                <a:shade val="50000"/>
-              </a:schemeClr>
-            </a:lnRef>
-            <a:fillRef idx="1">
-              <a:schemeClr val="accent1"/>
-            </a:fillRef>
-            <a:effectRef idx="0">
-              <a:schemeClr val="accent1"/>
-            </a:effectRef>
-            <a:fontRef idx="minor">
-              <a:schemeClr val="lt1"/>
-            </a:fontRef>
-          </p:style>
-          <p:txBody>
-            <a:bodyPr rtlCol="0" anchor="ctr"/>
-            <a:lstStyle/>
-            <a:p>
-              <a:pPr algn="ctr"/>
-              <a:endParaRPr lang="en-AU"/>
+              <a:endParaRPr lang="en-AU" sz="3200" dirty="0"/>
             </a:p>
           </p:txBody>
         </p:sp>
       </p:grpSp>
       <p:sp>
         <p:nvSpPr>
-          <p:cNvPr id="37" name="TextBox 36"/>
+          <p:cNvPr id="5" name="TextBox 4"/>
           <p:cNvSpPr txBox="1"/>
           <p:nvPr/>
         </p:nvSpPr>
         <p:spPr>
           <a:xfrm>
-            <a:off x="6332021" y="3065638"/>
-            <a:ext cx="2230099" cy="584775"/>
+            <a:off x="2409769" y="662804"/>
+            <a:ext cx="1081450" cy="646331"/>
           </a:xfrm>
           <a:prstGeom prst="rect">
             <a:avLst/>
@@ -19487,43 +19801,11 @@
           </a:bodyPr>
           <a:lstStyle/>
           <a:p>
-            <a:pPr algn="ctr"/>
             <a:r>
-              <a:rPr lang="en-AU" sz="3200" dirty="0" smtClean="0"/>
-              <a:t>Do nothing?</a:t>
+              <a:rPr lang="en-AU" sz="3600" b="1" dirty="0" smtClean="0"/>
+              <a:t>Now</a:t>
             </a:r>
-            <a:endParaRPr lang="en-AU" sz="3200" dirty="0"/>
-          </a:p>
-        </p:txBody>
-      </p:sp>
-      <p:sp>
-        <p:nvSpPr>
-          <p:cNvPr id="49" name="TextBox 48"/>
-          <p:cNvSpPr txBox="1"/>
-          <p:nvPr/>
-        </p:nvSpPr>
-        <p:spPr>
-          <a:xfrm>
-            <a:off x="6122974" y="847101"/>
-            <a:ext cx="2704010" cy="584775"/>
-          </a:xfrm>
-          <a:prstGeom prst="rect">
-            <a:avLst/>
-          </a:prstGeom>
-          <a:noFill/>
-        </p:spPr>
-        <p:txBody>
-          <a:bodyPr wrap="none" rtlCol="0">
-            <a:spAutoFit/>
-          </a:bodyPr>
-          <a:lstStyle/>
-          <a:p>
-            <a:pPr algn="ctr"/>
-            <a:r>
-              <a:rPr lang="en-AU" sz="3200" dirty="0" smtClean="0"/>
-              <a:t>Do something?</a:t>
-            </a:r>
-            <a:endParaRPr lang="en-AU" sz="3200" dirty="0"/>
+            <a:endParaRPr lang="en-AU" sz="3600" b="1" dirty="0"/>
           </a:p>
         </p:txBody>
       </p:sp>
@@ -32608,8 +32890,8 @@
         </p:nvSpPr>
         <p:spPr>
           <a:xfrm>
-            <a:off x="0" y="-23385"/>
-            <a:ext cx="9144000" cy="1293637"/>
+            <a:off x="-36000" y="1106550"/>
+            <a:ext cx="9216000" cy="2930400"/>
           </a:xfrm>
         </p:spPr>
         <p:txBody>
@@ -32619,367 +32901,38 @@
           <a:lstStyle/>
           <a:p>
             <a:r>
-              <a:rPr lang="en-AU" sz="4000" dirty="0" smtClean="0"/>
-              <a:t>How to design ecological surveys to </a:t>
+              <a:rPr lang="en-AU" sz="4800" dirty="0" smtClean="0"/>
+              <a:t>How to design ecological surveys </a:t>
             </a:r>
             <a:br>
-              <a:rPr lang="en-AU" sz="4000" dirty="0" smtClean="0"/>
+              <a:rPr lang="en-AU" sz="4800" dirty="0" smtClean="0"/>
             </a:br>
             <a:r>
-              <a:rPr lang="en-AU" sz="4000" dirty="0" smtClean="0"/>
-              <a:t>gather more evidence?</a:t>
+              <a:rPr lang="en-AU" sz="4800" dirty="0" smtClean="0"/>
+              <a:t>(gather evidence)</a:t>
             </a:r>
-            <a:endParaRPr lang="en-AU" sz="4000" dirty="0"/>
-          </a:p>
-        </p:txBody>
-      </p:sp>
-      <p:grpSp>
-        <p:nvGrpSpPr>
-          <p:cNvPr id="17" name="Group 16"/>
-          <p:cNvGrpSpPr/>
-          <p:nvPr/>
-        </p:nvGrpSpPr>
-        <p:grpSpPr>
-          <a:xfrm>
-            <a:off x="356884" y="1293403"/>
-            <a:ext cx="8428300" cy="954107"/>
-            <a:chOff x="275861" y="976945"/>
-            <a:chExt cx="8428300" cy="954107"/>
-          </a:xfrm>
-        </p:grpSpPr>
-        <p:sp>
-          <p:nvSpPr>
-            <p:cNvPr id="7" name="TextBox 6"/>
-            <p:cNvSpPr txBox="1"/>
-            <p:nvPr/>
-          </p:nvSpPr>
-          <p:spPr>
-            <a:xfrm>
-              <a:off x="275861" y="976945"/>
-              <a:ext cx="1944547" cy="954107"/>
-            </a:xfrm>
-            <a:prstGeom prst="rect">
-              <a:avLst/>
-            </a:prstGeom>
-            <a:noFill/>
-            <a:ln>
-              <a:solidFill>
-                <a:schemeClr val="tx1"/>
-              </a:solidFill>
-            </a:ln>
-          </p:spPr>
-          <p:txBody>
-            <a:bodyPr wrap="square" rtlCol="0">
-              <a:spAutoFit/>
-            </a:bodyPr>
-            <a:lstStyle/>
-            <a:p>
-              <a:pPr algn="ctr"/>
-              <a:r>
-                <a:rPr lang="en-AU" sz="2800" dirty="0" smtClean="0"/>
-                <a:t>Geographic </a:t>
-              </a:r>
-            </a:p>
-            <a:p>
-              <a:pPr algn="ctr"/>
-              <a:r>
-                <a:rPr lang="en-AU" sz="2800" dirty="0" smtClean="0"/>
-                <a:t>Coverage?</a:t>
-              </a:r>
-              <a:endParaRPr lang="en-AU" sz="2800" dirty="0"/>
-            </a:p>
-          </p:txBody>
-        </p:sp>
-        <p:sp>
-          <p:nvSpPr>
-            <p:cNvPr id="9" name="TextBox 8"/>
-            <p:cNvSpPr txBox="1"/>
-            <p:nvPr/>
-          </p:nvSpPr>
-          <p:spPr>
-            <a:xfrm>
-              <a:off x="2435505" y="976945"/>
-              <a:ext cx="2403675" cy="954107"/>
-            </a:xfrm>
-            <a:prstGeom prst="rect">
-              <a:avLst/>
-            </a:prstGeom>
-            <a:noFill/>
-            <a:ln>
-              <a:solidFill>
-                <a:schemeClr val="tx1"/>
-              </a:solidFill>
-            </a:ln>
-          </p:spPr>
-          <p:txBody>
-            <a:bodyPr wrap="square" rtlCol="0">
-              <a:spAutoFit/>
-            </a:bodyPr>
-            <a:lstStyle/>
-            <a:p>
-              <a:pPr algn="ctr"/>
-              <a:r>
-                <a:rPr lang="en-AU" sz="2800" dirty="0" smtClean="0"/>
-                <a:t>Environmental </a:t>
-              </a:r>
-            </a:p>
-            <a:p>
-              <a:pPr algn="ctr"/>
-              <a:r>
-                <a:rPr lang="en-AU" sz="2800" dirty="0"/>
-                <a:t>c</a:t>
-              </a:r>
-              <a:r>
-                <a:rPr lang="en-AU" sz="2800" dirty="0" smtClean="0"/>
-                <a:t>onditions?</a:t>
-              </a:r>
-              <a:endParaRPr lang="en-AU" sz="2800" dirty="0"/>
-            </a:p>
-          </p:txBody>
-        </p:sp>
-        <p:sp>
-          <p:nvSpPr>
-            <p:cNvPr id="10" name="TextBox 9"/>
-            <p:cNvSpPr txBox="1"/>
-            <p:nvPr/>
-          </p:nvSpPr>
-          <p:spPr>
-            <a:xfrm>
-              <a:off x="5054277" y="976945"/>
-              <a:ext cx="3649884" cy="954107"/>
-            </a:xfrm>
-            <a:prstGeom prst="rect">
-              <a:avLst/>
-            </a:prstGeom>
-            <a:noFill/>
-            <a:ln>
-              <a:solidFill>
-                <a:schemeClr val="tx1"/>
-              </a:solidFill>
-            </a:ln>
-          </p:spPr>
-          <p:txBody>
-            <a:bodyPr wrap="square" rtlCol="0">
-              <a:spAutoFit/>
-            </a:bodyPr>
-            <a:lstStyle/>
-            <a:p>
-              <a:pPr algn="ctr"/>
-              <a:r>
-                <a:rPr lang="en-AU" sz="2800" dirty="0" smtClean="0"/>
-                <a:t>Cheapest places for </a:t>
-              </a:r>
-            </a:p>
-            <a:p>
-              <a:pPr algn="ctr"/>
-              <a:r>
-                <a:rPr lang="en-AU" sz="2800" dirty="0" smtClean="0"/>
-                <a:t>conservation actions?</a:t>
-              </a:r>
-              <a:endParaRPr lang="en-AU" sz="2800" dirty="0"/>
-            </a:p>
-          </p:txBody>
-        </p:sp>
-      </p:grpSp>
-      <p:grpSp>
-        <p:nvGrpSpPr>
-          <p:cNvPr id="16" name="Group 15"/>
-          <p:cNvGrpSpPr/>
-          <p:nvPr/>
-        </p:nvGrpSpPr>
-        <p:grpSpPr>
-          <a:xfrm>
-            <a:off x="824943" y="2451424"/>
-            <a:ext cx="7492182" cy="1384995"/>
-            <a:chOff x="986740" y="2104183"/>
-            <a:chExt cx="7492182" cy="1384995"/>
-          </a:xfrm>
-        </p:grpSpPr>
-        <p:sp>
-          <p:nvSpPr>
-            <p:cNvPr id="11" name="TextBox 10"/>
-            <p:cNvSpPr txBox="1"/>
-            <p:nvPr/>
-          </p:nvSpPr>
-          <p:spPr>
-            <a:xfrm>
-              <a:off x="986740" y="2104183"/>
-              <a:ext cx="3429966" cy="1384995"/>
-            </a:xfrm>
-            <a:prstGeom prst="rect">
-              <a:avLst/>
-            </a:prstGeom>
-            <a:noFill/>
-            <a:ln>
-              <a:solidFill>
-                <a:schemeClr val="tx1"/>
-              </a:solidFill>
-            </a:ln>
-          </p:spPr>
-          <p:txBody>
-            <a:bodyPr wrap="square" rtlCol="0">
-              <a:spAutoFit/>
-            </a:bodyPr>
-            <a:lstStyle/>
-            <a:p>
-              <a:pPr algn="ctr"/>
-              <a:r>
-                <a:rPr lang="en-AU" sz="2800" dirty="0" smtClean="0"/>
-                <a:t>Places where we think threatened species</a:t>
-              </a:r>
-            </a:p>
-            <a:p>
-              <a:pPr algn="ctr"/>
-              <a:r>
-                <a:rPr lang="en-AU" sz="2800" dirty="0" smtClean="0"/>
-                <a:t>might occur?</a:t>
-              </a:r>
-              <a:endParaRPr lang="en-AU" sz="2800" dirty="0"/>
-            </a:p>
-          </p:txBody>
-        </p:sp>
-        <p:sp>
-          <p:nvSpPr>
-            <p:cNvPr id="12" name="TextBox 11"/>
-            <p:cNvSpPr txBox="1"/>
-            <p:nvPr/>
-          </p:nvSpPr>
-          <p:spPr>
-            <a:xfrm>
-              <a:off x="4707032" y="2104183"/>
-              <a:ext cx="3771890" cy="1384995"/>
-            </a:xfrm>
-            <a:prstGeom prst="rect">
-              <a:avLst/>
-            </a:prstGeom>
-            <a:noFill/>
-            <a:ln>
-              <a:solidFill>
-                <a:schemeClr val="tx1"/>
-              </a:solidFill>
-            </a:ln>
-          </p:spPr>
-          <p:txBody>
-            <a:bodyPr wrap="square" rtlCol="0">
-              <a:spAutoFit/>
-            </a:bodyPr>
-            <a:lstStyle/>
-            <a:p>
-              <a:pPr algn="ctr"/>
-              <a:r>
-                <a:rPr lang="en-AU" sz="2800" dirty="0" smtClean="0"/>
-                <a:t>Places where we are uncertain if threatened species occur there?</a:t>
-              </a:r>
-              <a:endParaRPr lang="en-AU" sz="2800" dirty="0"/>
-            </a:p>
-          </p:txBody>
-        </p:sp>
-      </p:grpSp>
-      <p:grpSp>
-        <p:nvGrpSpPr>
-          <p:cNvPr id="15" name="Group 14"/>
-          <p:cNvGrpSpPr/>
-          <p:nvPr/>
-        </p:nvGrpSpPr>
-        <p:grpSpPr>
-          <a:xfrm>
-            <a:off x="969068" y="4098279"/>
-            <a:ext cx="7287354" cy="958132"/>
-            <a:chOff x="945580" y="3751038"/>
-            <a:chExt cx="7287354" cy="958132"/>
-          </a:xfrm>
-        </p:grpSpPr>
-        <p:sp>
-          <p:nvSpPr>
-            <p:cNvPr id="13" name="TextBox 12"/>
-            <p:cNvSpPr txBox="1"/>
-            <p:nvPr/>
-          </p:nvSpPr>
-          <p:spPr>
-            <a:xfrm>
-              <a:off x="4623613" y="3751038"/>
-              <a:ext cx="3609321" cy="954107"/>
-            </a:xfrm>
-            <a:prstGeom prst="rect">
-              <a:avLst/>
-            </a:prstGeom>
-            <a:noFill/>
-            <a:ln>
-              <a:solidFill>
-                <a:schemeClr val="tx1"/>
-              </a:solidFill>
-            </a:ln>
-          </p:spPr>
-          <p:txBody>
-            <a:bodyPr wrap="none" rtlCol="0">
-              <a:spAutoFit/>
-            </a:bodyPr>
-            <a:lstStyle/>
-            <a:p>
-              <a:pPr algn="ctr"/>
-              <a:r>
-                <a:rPr lang="en-AU" sz="2800" dirty="0" smtClean="0"/>
-                <a:t>Can’t we just maximize </a:t>
-              </a:r>
-            </a:p>
-            <a:p>
-              <a:pPr algn="ctr"/>
-              <a:r>
-                <a:rPr lang="en-AU" sz="2800" dirty="0" smtClean="0"/>
-                <a:t>return on investment?</a:t>
-              </a:r>
-              <a:endParaRPr lang="en-AU" sz="2800" dirty="0"/>
-            </a:p>
-          </p:txBody>
-        </p:sp>
-        <p:sp>
-          <p:nvSpPr>
-            <p:cNvPr id="14" name="TextBox 13"/>
-            <p:cNvSpPr txBox="1"/>
-            <p:nvPr/>
-          </p:nvSpPr>
-          <p:spPr>
-            <a:xfrm>
-              <a:off x="945580" y="3755063"/>
-              <a:ext cx="3471126" cy="954107"/>
-            </a:xfrm>
-            <a:prstGeom prst="rect">
-              <a:avLst/>
-            </a:prstGeom>
-            <a:noFill/>
-            <a:ln>
-              <a:solidFill>
-                <a:schemeClr val="tx1"/>
-              </a:solidFill>
-            </a:ln>
-          </p:spPr>
-          <p:txBody>
-            <a:bodyPr wrap="square" rtlCol="0">
-              <a:spAutoFit/>
-            </a:bodyPr>
-            <a:lstStyle/>
-            <a:p>
-              <a:pPr algn="ctr"/>
-              <a:r>
-                <a:rPr lang="en-AU" sz="2800" dirty="0" smtClean="0"/>
-                <a:t>No where?</a:t>
-              </a:r>
-            </a:p>
-            <a:p>
-              <a:pPr algn="ctr"/>
-              <a:r>
-                <a:rPr lang="en-AU" sz="2800" dirty="0" smtClean="0"/>
-                <a:t>Just use existing data</a:t>
-              </a:r>
-              <a:endParaRPr lang="en-AU" sz="2800" dirty="0"/>
-            </a:p>
-          </p:txBody>
-        </p:sp>
-      </p:grpSp>
+            <a:br>
+              <a:rPr lang="en-AU" sz="4800" dirty="0" smtClean="0"/>
+            </a:br>
+            <a:r>
+              <a:rPr lang="en-AU" sz="4800" dirty="0" smtClean="0"/>
+              <a:t>to maximize</a:t>
+            </a:r>
+            <a:br>
+              <a:rPr lang="en-AU" sz="4800" dirty="0" smtClean="0"/>
+            </a:br>
+            <a:r>
+              <a:rPr lang="en-AU" sz="4800" dirty="0" smtClean="0"/>
+              <a:t>conservation outcomes?</a:t>
+            </a:r>
+            <a:endParaRPr lang="en-AU" sz="4800" dirty="0"/>
+          </a:p>
+        </p:txBody>
+      </p:sp>
     </p:spTree>
     <p:extLst>
       <p:ext uri="{BB962C8B-B14F-4D97-AF65-F5344CB8AC3E}">
-        <p14:creationId xmlns:p14="http://schemas.microsoft.com/office/powerpoint/2010/main" val="779744968"/>
+        <p14:creationId xmlns:p14="http://schemas.microsoft.com/office/powerpoint/2010/main" val="1620454572"/>
       </p:ext>
     </p:extLst>
   </p:cSld>
@@ -33165,11 +33118,7 @@
             <a:pPr algn="ctr"/>
             <a:r>
               <a:rPr lang="en-AU" dirty="0" smtClean="0"/>
-              <a:t>142 </a:t>
-            </a:r>
-            <a:r>
-              <a:rPr lang="en-AU" dirty="0" smtClean="0"/>
-              <a:t>places that could potentially be surveyed to</a:t>
+              <a:t>90 places that could potentially be surveyed to</a:t>
             </a:r>
           </a:p>
           <a:p>
@@ -33254,7 +33203,7 @@
               <a:pPr algn="ctr"/>
               <a:r>
                 <a:rPr lang="en-AU" dirty="0" smtClean="0"/>
-                <a:t>90 places that could</a:t>
+                <a:t>142 places that could</a:t>
               </a:r>
             </a:p>
             <a:p>
@@ -33268,11 +33217,7 @@
               <a:pPr algn="ctr"/>
               <a:r>
                 <a:rPr lang="en-AU" dirty="0" smtClean="0"/>
-                <a:t>protected area </a:t>
-              </a:r>
-              <a:r>
-                <a:rPr lang="en-AU" dirty="0" smtClean="0"/>
-                <a:t>establishment</a:t>
+                <a:t>protected area establishment</a:t>
               </a:r>
               <a:endParaRPr lang="en-AU" dirty="0"/>
             </a:p>
@@ -33333,11 +33278,327 @@
         </p:blipFill>
         <p:spPr>
           <a:xfrm>
-            <a:off x="1545113" y="133593"/>
-            <a:ext cx="6053774" cy="4876315"/>
+            <a:off x="1660566" y="79200"/>
+            <a:ext cx="5774306" cy="4651202"/>
           </a:xfrm>
         </p:spPr>
       </p:pic>
+      <p:sp>
+        <p:nvSpPr>
+          <p:cNvPr id="2" name="Up Arrow 1"/>
+          <p:cNvSpPr/>
+          <p:nvPr/>
+        </p:nvSpPr>
+        <p:spPr>
+          <a:xfrm>
+            <a:off x="937980" y="157593"/>
+            <a:ext cx="684000" cy="4260787"/>
+          </a:xfrm>
+          <a:prstGeom prst="upArrow">
+            <a:avLst/>
+          </a:prstGeom>
+          <a:noFill/>
+          <a:ln>
+            <a:solidFill>
+              <a:schemeClr val="tx1"/>
+            </a:solidFill>
+          </a:ln>
+        </p:spPr>
+        <p:style>
+          <a:lnRef idx="2">
+            <a:schemeClr val="accent1">
+              <a:shade val="50000"/>
+            </a:schemeClr>
+          </a:lnRef>
+          <a:fillRef idx="1">
+            <a:schemeClr val="accent1"/>
+          </a:fillRef>
+          <a:effectRef idx="0">
+            <a:schemeClr val="accent1"/>
+          </a:effectRef>
+          <a:fontRef idx="minor">
+            <a:schemeClr val="lt1"/>
+          </a:fontRef>
+        </p:style>
+        <p:txBody>
+          <a:bodyPr rtlCol="0" anchor="ctr"/>
+          <a:lstStyle/>
+          <a:p>
+            <a:pPr algn="ctr"/>
+            <a:endParaRPr lang="en-AU"/>
+          </a:p>
+        </p:txBody>
+      </p:sp>
+      <p:sp>
+        <p:nvSpPr>
+          <p:cNvPr id="3" name="TextBox 2"/>
+          <p:cNvSpPr txBox="1"/>
+          <p:nvPr/>
+        </p:nvSpPr>
+        <p:spPr>
+          <a:xfrm rot="16200000">
+            <a:off x="-1908025" y="2107340"/>
+            <a:ext cx="4953344" cy="738664"/>
+          </a:xfrm>
+          <a:prstGeom prst="rect">
+            <a:avLst/>
+          </a:prstGeom>
+          <a:noFill/>
+        </p:spPr>
+        <p:txBody>
+          <a:bodyPr wrap="none" rtlCol="0">
+            <a:spAutoFit/>
+          </a:bodyPr>
+          <a:lstStyle/>
+          <a:p>
+            <a:pPr algn="ctr"/>
+            <a:r>
+              <a:rPr lang="en-AU" sz="2400" dirty="0" smtClean="0"/>
+              <a:t>Number of places selected for surveys</a:t>
+            </a:r>
+          </a:p>
+          <a:p>
+            <a:pPr algn="ctr"/>
+            <a:r>
+              <a:rPr lang="en-AU" dirty="0" smtClean="0"/>
+              <a:t>(amount of funds allocated for gathering evidence)</a:t>
+            </a:r>
+            <a:endParaRPr lang="en-AU" dirty="0"/>
+          </a:p>
+        </p:txBody>
+      </p:sp>
+      <p:sp>
+        <p:nvSpPr>
+          <p:cNvPr id="4" name="TextBox 3"/>
+          <p:cNvSpPr txBox="1"/>
+          <p:nvPr/>
+        </p:nvSpPr>
+        <p:spPr>
+          <a:xfrm>
+            <a:off x="1803346" y="4766400"/>
+            <a:ext cx="5488747" cy="400110"/>
+          </a:xfrm>
+          <a:prstGeom prst="rect">
+            <a:avLst/>
+          </a:prstGeom>
+          <a:noFill/>
+        </p:spPr>
+        <p:txBody>
+          <a:bodyPr wrap="none" rtlCol="0">
+            <a:spAutoFit/>
+          </a:bodyPr>
+          <a:lstStyle/>
+          <a:p>
+            <a:r>
+              <a:rPr lang="en-AU" sz="2000" dirty="0" smtClean="0"/>
+              <a:t>Different approaches for designing survey schemes</a:t>
+            </a:r>
+            <a:endParaRPr lang="en-AU" sz="2000" dirty="0"/>
+          </a:p>
+        </p:txBody>
+      </p:sp>
+      <p:grpSp>
+        <p:nvGrpSpPr>
+          <p:cNvPr id="12" name="Group 11"/>
+          <p:cNvGrpSpPr/>
+          <p:nvPr/>
+        </p:nvGrpSpPr>
+        <p:grpSpPr>
+          <a:xfrm>
+            <a:off x="7727482" y="444384"/>
+            <a:ext cx="1119153" cy="948731"/>
+            <a:chOff x="7726277" y="444384"/>
+            <a:chExt cx="1119153" cy="948731"/>
+          </a:xfrm>
+        </p:grpSpPr>
+        <p:sp>
+          <p:nvSpPr>
+            <p:cNvPr id="5" name="TextBox 4"/>
+            <p:cNvSpPr txBox="1"/>
+            <p:nvPr/>
+          </p:nvSpPr>
+          <p:spPr>
+            <a:xfrm>
+              <a:off x="7726277" y="746784"/>
+              <a:ext cx="1119153" cy="646331"/>
+            </a:xfrm>
+            <a:prstGeom prst="rect">
+              <a:avLst/>
+            </a:prstGeom>
+            <a:noFill/>
+          </p:spPr>
+          <p:txBody>
+            <a:bodyPr wrap="none" rtlCol="0">
+              <a:spAutoFit/>
+            </a:bodyPr>
+            <a:lstStyle/>
+            <a:p>
+              <a:pPr algn="ctr"/>
+              <a:r>
+                <a:rPr lang="en-AU" dirty="0" smtClean="0"/>
+                <a:t>Selected </a:t>
+              </a:r>
+            </a:p>
+            <a:p>
+              <a:pPr algn="ctr"/>
+              <a:r>
+                <a:rPr lang="en-AU" dirty="0" smtClean="0"/>
+                <a:t>for survey</a:t>
+              </a:r>
+              <a:endParaRPr lang="en-AU" dirty="0"/>
+            </a:p>
+          </p:txBody>
+        </p:sp>
+        <p:sp>
+          <p:nvSpPr>
+            <p:cNvPr id="8" name="Rectangle 7"/>
+            <p:cNvSpPr/>
+            <p:nvPr/>
+          </p:nvSpPr>
+          <p:spPr>
+            <a:xfrm>
+              <a:off x="8134653" y="444384"/>
+              <a:ext cx="302400" cy="302400"/>
+            </a:xfrm>
+            <a:prstGeom prst="rect">
+              <a:avLst/>
+            </a:prstGeom>
+            <a:solidFill>
+              <a:srgbClr val="FF0000"/>
+            </a:solidFill>
+            <a:ln>
+              <a:solidFill>
+                <a:srgbClr val="E6E6E6"/>
+              </a:solidFill>
+            </a:ln>
+          </p:spPr>
+          <p:style>
+            <a:lnRef idx="2">
+              <a:schemeClr val="accent1">
+                <a:shade val="50000"/>
+              </a:schemeClr>
+            </a:lnRef>
+            <a:fillRef idx="1">
+              <a:schemeClr val="accent1"/>
+            </a:fillRef>
+            <a:effectRef idx="0">
+              <a:schemeClr val="accent1"/>
+            </a:effectRef>
+            <a:fontRef idx="minor">
+              <a:schemeClr val="lt1"/>
+            </a:fontRef>
+          </p:style>
+          <p:txBody>
+            <a:bodyPr rtlCol="0" anchor="ctr"/>
+            <a:lstStyle/>
+            <a:p>
+              <a:pPr algn="ctr"/>
+              <a:endParaRPr lang="en-AU"/>
+            </a:p>
+          </p:txBody>
+        </p:sp>
+      </p:grpSp>
+      <p:grpSp>
+        <p:nvGrpSpPr>
+          <p:cNvPr id="11" name="Group 10"/>
+          <p:cNvGrpSpPr/>
+          <p:nvPr/>
+        </p:nvGrpSpPr>
+        <p:grpSpPr>
+          <a:xfrm>
+            <a:off x="7546663" y="1747753"/>
+            <a:ext cx="1480790" cy="962297"/>
+            <a:chOff x="7568263" y="1747753"/>
+            <a:chExt cx="1480790" cy="962297"/>
+          </a:xfrm>
+        </p:grpSpPr>
+        <p:sp>
+          <p:nvSpPr>
+            <p:cNvPr id="9" name="Rectangle 8"/>
+            <p:cNvSpPr/>
+            <p:nvPr/>
+          </p:nvSpPr>
+          <p:spPr>
+            <a:xfrm>
+              <a:off x="8157458" y="1747753"/>
+              <a:ext cx="302400" cy="302400"/>
+            </a:xfrm>
+            <a:prstGeom prst="rect">
+              <a:avLst/>
+            </a:prstGeom>
+            <a:solidFill>
+              <a:schemeClr val="bg1"/>
+            </a:solidFill>
+            <a:ln>
+              <a:solidFill>
+                <a:srgbClr val="E5E5E5"/>
+              </a:solidFill>
+            </a:ln>
+          </p:spPr>
+          <p:style>
+            <a:lnRef idx="2">
+              <a:schemeClr val="accent1">
+                <a:shade val="50000"/>
+              </a:schemeClr>
+            </a:lnRef>
+            <a:fillRef idx="1">
+              <a:schemeClr val="accent1"/>
+            </a:fillRef>
+            <a:effectRef idx="0">
+              <a:schemeClr val="accent1"/>
+            </a:effectRef>
+            <a:fontRef idx="minor">
+              <a:schemeClr val="lt1"/>
+            </a:fontRef>
+          </p:style>
+          <p:txBody>
+            <a:bodyPr rtlCol="0" anchor="ctr"/>
+            <a:lstStyle/>
+            <a:p>
+              <a:pPr algn="ctr"/>
+              <a:endParaRPr lang="en-AU"/>
+            </a:p>
+          </p:txBody>
+        </p:sp>
+        <p:sp>
+          <p:nvSpPr>
+            <p:cNvPr id="10" name="TextBox 9"/>
+            <p:cNvSpPr txBox="1"/>
+            <p:nvPr/>
+          </p:nvSpPr>
+          <p:spPr>
+            <a:xfrm>
+              <a:off x="7568263" y="2063719"/>
+              <a:ext cx="1480790" cy="646331"/>
+            </a:xfrm>
+            <a:prstGeom prst="rect">
+              <a:avLst/>
+            </a:prstGeom>
+            <a:noFill/>
+          </p:spPr>
+          <p:txBody>
+            <a:bodyPr wrap="none" rtlCol="0">
+              <a:spAutoFit/>
+            </a:bodyPr>
+            <a:lstStyle/>
+            <a:p>
+              <a:pPr algn="ctr"/>
+              <a:r>
+                <a:rPr lang="en-AU" dirty="0" smtClean="0"/>
+                <a:t>NOT selected </a:t>
+              </a:r>
+            </a:p>
+            <a:p>
+              <a:pPr algn="ctr"/>
+              <a:r>
+                <a:rPr lang="en-AU" dirty="0" smtClean="0"/>
+                <a:t>for survey</a:t>
+              </a:r>
+              <a:endParaRPr lang="en-AU" dirty="0"/>
+            </a:p>
+          </p:txBody>
+        </p:sp>
+      </p:grpSp>
     </p:spTree>
     <p:extLst>
       <p:ext uri="{BB962C8B-B14F-4D97-AF65-F5344CB8AC3E}">

</xml_diff>